<commit_message>
typo corrections and assignment HA01 details
</commit_message>
<xml_diff>
--- a/Slides/2020-Even-DAA-L07-Important-Problem-Types.pptx
+++ b/Slides/2020-Even-DAA-L07-Important-Problem-Types.pptx
@@ -5694,7 +5694,7 @@
           <a:p>
             <a:pPr/>
             <a:r>
-              <a:t>Example problmes</a:t>
+              <a:t>Example problems</a:t>
             </a:r>
           </a:p>
           <a:p>
@@ -6279,7 +6279,7 @@
       </p:sp>
       <p:sp>
         <p:nvSpPr>
-          <p:cNvPr id="123" name="Problems involving mathematecal objects…"/>
+          <p:cNvPr id="123" name="Problems involving mathematical objects…"/>
           <p:cNvSpPr txBox="1"/>
           <p:nvPr>
             <p:ph type="body" idx="1"/>
@@ -6300,7 +6300,7 @@
           <a:p>
             <a:pPr/>
             <a:r>
-              <a:t>Problems involving mathematecal objects</a:t>
+              <a:t>Problems involving mathematical objects</a:t>
             </a:r>
           </a:p>
           <a:p>

</xml_diff>